<commit_message>
scrum into modified waterfall
</commit_message>
<xml_diff>
--- a/presentation/GROUP 13.pptx
+++ b/presentation/GROUP 13.pptx
@@ -5922,9 +5922,6 @@
             </a:endParaRPr>
           </a:p>
           <a:p>
-            <a:pPr marL="45720" lvl="0" indent="0">
-              <a:buNone/>
-            </a:pPr>
             <a:r>
               <a:rPr lang="en-GB" sz="2800" dirty="0" smtClean="0">
                 <a:solidFill>
@@ -5935,10 +5932,12 @@
                 <a:latin typeface="Adobe Fan Heiti Std B" panose="020B0700000000000000" pitchFamily="34" charset="-128"/>
                 <a:ea typeface="Adobe Fan Heiti Std B" panose="020B0700000000000000" pitchFamily="34" charset="-128"/>
               </a:rPr>
-              <a:t>Agile </a:t>
-            </a:r>
-            <a:r>
-              <a:rPr lang="en-GB" sz="2800" dirty="0">
+              <a:t>Long life time</a:t>
+            </a:r>
+          </a:p>
+          <a:p>
+            <a:r>
+              <a:rPr lang="en-GB" sz="2800" dirty="0" smtClean="0">
                 <a:solidFill>
                   <a:schemeClr val="bg2">
                     <a:lumMod val="50000"/>
@@ -5947,8 +5946,80 @@
                 <a:latin typeface="Adobe Fan Heiti Std B" panose="020B0700000000000000" pitchFamily="34" charset="-128"/>
                 <a:ea typeface="Adobe Fan Heiti Std B" panose="020B0700000000000000" pitchFamily="34" charset="-128"/>
               </a:rPr>
-              <a:t>Methodology – SCRUM</a:t>
-            </a:r>
+              <a:t>unstable </a:t>
+            </a:r>
+            <a:r>
+              <a:rPr lang="en-GB" sz="2800" dirty="0" smtClean="0">
+                <a:solidFill>
+                  <a:schemeClr val="bg2">
+                    <a:lumMod val="50000"/>
+                  </a:schemeClr>
+                </a:solidFill>
+                <a:latin typeface="Adobe Fan Heiti Std B" panose="020B0700000000000000" pitchFamily="34" charset="-128"/>
+                <a:ea typeface="Adobe Fan Heiti Std B" panose="020B0700000000000000" pitchFamily="34" charset="-128"/>
+              </a:rPr>
+              <a:t>requirements</a:t>
+            </a:r>
+          </a:p>
+          <a:p>
+            <a:endParaRPr lang="en-GB" sz="2800" dirty="0">
+              <a:solidFill>
+                <a:schemeClr val="bg2">
+                  <a:lumMod val="50000"/>
+                </a:schemeClr>
+              </a:solidFill>
+              <a:latin typeface="Adobe Fan Heiti Std B" panose="020B0700000000000000" pitchFamily="34" charset="-128"/>
+              <a:ea typeface="Adobe Fan Heiti Std B" panose="020B0700000000000000" pitchFamily="34" charset="-128"/>
+            </a:endParaRPr>
+          </a:p>
+          <a:p>
+            <a:pPr marL="45720" indent="0">
+              <a:buNone/>
+            </a:pPr>
+            <a:r>
+              <a:rPr lang="en-GB" sz="2800" dirty="0" smtClean="0">
+                <a:solidFill>
+                  <a:schemeClr val="bg2">
+                    <a:lumMod val="50000"/>
+                  </a:schemeClr>
+                </a:solidFill>
+                <a:latin typeface="Adobe Fan Heiti Std B" panose="020B0700000000000000" pitchFamily="34" charset="-128"/>
+                <a:ea typeface="Adobe Fan Heiti Std B" panose="020B0700000000000000" pitchFamily="34" charset="-128"/>
+              </a:rPr>
+              <a:t>Therefore we use </a:t>
+            </a:r>
+            <a:r>
+              <a:rPr lang="en-GB" sz="2800" smtClean="0">
+                <a:solidFill>
+                  <a:schemeClr val="bg2">
+                    <a:lumMod val="50000"/>
+                  </a:schemeClr>
+                </a:solidFill>
+                <a:latin typeface="Adobe Fan Heiti Std B" panose="020B0700000000000000" pitchFamily="34" charset="-128"/>
+                <a:ea typeface="Adobe Fan Heiti Std B" panose="020B0700000000000000" pitchFamily="34" charset="-128"/>
+              </a:rPr>
+              <a:t>modified waterfall</a:t>
+            </a:r>
+            <a:endParaRPr lang="en-GB" sz="2800" dirty="0" smtClean="0">
+              <a:solidFill>
+                <a:schemeClr val="bg2">
+                  <a:lumMod val="50000"/>
+                </a:schemeClr>
+              </a:solidFill>
+              <a:latin typeface="Adobe Fan Heiti Std B" panose="020B0700000000000000" pitchFamily="34" charset="-128"/>
+              <a:ea typeface="Adobe Fan Heiti Std B" panose="020B0700000000000000" pitchFamily="34" charset="-128"/>
+            </a:endParaRPr>
+          </a:p>
+          <a:p>
+            <a:endParaRPr lang="en-GB" sz="2800" dirty="0">
+              <a:solidFill>
+                <a:schemeClr val="bg2">
+                  <a:lumMod val="50000"/>
+                </a:schemeClr>
+              </a:solidFill>
+              <a:latin typeface="Adobe Fan Heiti Std B" panose="020B0700000000000000" pitchFamily="34" charset="-128"/>
+              <a:ea typeface="Adobe Fan Heiti Std B" panose="020B0700000000000000" pitchFamily="34" charset="-128"/>
+            </a:endParaRPr>
           </a:p>
           <a:p>
             <a:pPr marL="45720" lvl="0" indent="0">
@@ -5969,46 +6040,19 @@
               <a:buFontTx/>
               <a:buChar char="-"/>
             </a:pPr>
-            <a:r>
-              <a:rPr lang="en-GB" sz="2800" dirty="0">
-                <a:solidFill>
-                  <a:schemeClr val="bg2">
-                    <a:lumMod val="50000"/>
-                  </a:schemeClr>
-                </a:solidFill>
-                <a:ea typeface="Adobe Fan Heiti Std B" panose="020B0700000000000000" pitchFamily="34" charset="-128"/>
-              </a:rPr>
-              <a:t>A faster development methodology</a:t>
-            </a:r>
-          </a:p>
-          <a:p>
-            <a:pPr lvl="0">
-              <a:buFontTx/>
-              <a:buChar char="-"/>
+            <a:endParaRPr lang="en-GB" sz="2800" dirty="0">
+              <a:solidFill>
+                <a:schemeClr val="bg2">
+                  <a:lumMod val="50000"/>
+                </a:schemeClr>
+              </a:solidFill>
+              <a:ea typeface="Adobe Fan Heiti Std B" panose="020B0700000000000000" pitchFamily="34" charset="-128"/>
+            </a:endParaRPr>
+          </a:p>
+          <a:p>
+            <a:pPr marL="45720" lvl="0" indent="0">
+              <a:buNone/>
             </a:pPr>
-            <a:r>
-              <a:rPr lang="en-GB" sz="2800" dirty="0">
-                <a:solidFill>
-                  <a:schemeClr val="bg2">
-                    <a:lumMod val="50000"/>
-                  </a:schemeClr>
-                </a:solidFill>
-                <a:latin typeface="Adobe Fan Heiti Std B" panose="020B0700000000000000" pitchFamily="34" charset="-128"/>
-                <a:ea typeface="Adobe Fan Heiti Std B" panose="020B0700000000000000" pitchFamily="34" charset="-128"/>
-              </a:rPr>
-              <a:t> </a:t>
-            </a:r>
-            <a:r>
-              <a:rPr lang="en-GB" sz="2800" dirty="0">
-                <a:solidFill>
-                  <a:schemeClr val="bg2">
-                    <a:lumMod val="50000"/>
-                  </a:schemeClr>
-                </a:solidFill>
-                <a:ea typeface="Adobe Fan Heiti Std B" panose="020B0700000000000000" pitchFamily="34" charset="-128"/>
-              </a:rPr>
-              <a:t>Can conduct SCRUM sessions which would resolve the issues which the team members would meet</a:t>
-            </a:r>
             <a:endParaRPr lang="en-GB" sz="2800" dirty="0">
               <a:solidFill>
                 <a:schemeClr val="bg2">
@@ -9681,26 +9725,6 @@
 </file>
 
 <file path=customXml/item1.xml><?xml version="1.0" encoding="utf-8"?>
-<?mso-contentType ?>
-<FormTemplates xmlns="http://schemas.microsoft.com/sharepoint/v3/contenttype/forms">
-  <Display>DocumentLibraryForm</Display>
-  <Edit>DocumentLibraryForm</Edit>
-  <New>DocumentLibraryForm</New>
-</FormTemplates>
-</file>
-
-<file path=customXml/item2.xml><?xml version="1.0" encoding="utf-8"?>
-<p:properties xmlns:p="http://schemas.microsoft.com/office/2006/metadata/properties" xmlns:xsi="http://www.w3.org/2001/XMLSchema-instance" xmlns:pc="http://schemas.microsoft.com/office/infopath/2007/PartnerControls">
-  <documentManagement>
-    <VSO_x0020_item_x0020_id xmlns="40262f94-9f35-4ac3-9a90-690165a166b7" xsi:nil="true"/>
-    <Assetid_x0020_ xmlns="40262f94-9f35-4ac3-9a90-690165a166b7" xsi:nil="true"/>
-    <Item_x0020_Details xmlns="40262f94-9f35-4ac3-9a90-690165a166b7" xsi:nil="true"/>
-    <Template_x0020_details xmlns="40262f94-9f35-4ac3-9a90-690165a166b7" xsi:nil="true"/>
-  </documentManagement>
-</p:properties>
-</file>
-
-<file path=customXml/item3.xml><?xml version="1.0" encoding="utf-8"?>
 <ct:contentTypeSchema xmlns:ct="http://schemas.microsoft.com/office/2006/metadata/contentType" xmlns:ma="http://schemas.microsoft.com/office/2006/metadata/properties/metaAttributes" ct:_="" ma:_="" ma:contentTypeName="Document" ma:contentTypeID="0x010100AA3F7D94069FF64A86F7DFF56D60E3BE" ma:contentTypeVersion="6" ma:contentTypeDescription="Create a new document." ma:contentTypeScope="" ma:versionID="c32302c77d4085ecf495bdddb7f5e889">
   <xsd:schema xmlns:xsd="http://www.w3.org/2001/XMLSchema" xmlns:xs="http://www.w3.org/2001/XMLSchema" xmlns:p="http://schemas.microsoft.com/office/2006/metadata/properties" xmlns:ns2="a4f35948-e619-41b3-aa29-22878b09cfd2" xmlns:ns3="40262f94-9f35-4ac3-9a90-690165a166b7" targetNamespace="http://schemas.microsoft.com/office/2006/metadata/properties" ma:root="true" ma:fieldsID="4ab5ae46be95f9d0be6107e8200be7a2" ns2:_="" ns3:_="">
     <xsd:import namespace="a4f35948-e619-41b3-aa29-22878b09cfd2"/>
@@ -9881,32 +9905,27 @@
 </ct:contentTypeSchema>
 </file>
 
-<file path=customXml/itemProps1.xml><?xml version="1.0" encoding="utf-8"?>
-<ds:datastoreItem xmlns:ds="http://schemas.openxmlformats.org/officeDocument/2006/customXml" ds:itemID="{653E1689-1E09-4ADC-A5E7-6718BF79A8A6}">
-  <ds:schemaRefs>
-    <ds:schemaRef ds:uri="http://schemas.microsoft.com/sharepoint/v3/contenttype/forms"/>
-  </ds:schemaRefs>
-</ds:datastoreItem>
+<file path=customXml/item2.xml><?xml version="1.0" encoding="utf-8"?>
+<?mso-contentType ?>
+<FormTemplates xmlns="http://schemas.microsoft.com/sharepoint/v3/contenttype/forms">
+  <Display>DocumentLibraryForm</Display>
+  <Edit>DocumentLibraryForm</Edit>
+  <New>DocumentLibraryForm</New>
+</FormTemplates>
 </file>
 
-<file path=customXml/itemProps2.xml><?xml version="1.0" encoding="utf-8"?>
-<ds:datastoreItem xmlns:ds="http://schemas.openxmlformats.org/officeDocument/2006/customXml" ds:itemID="{3FFF1070-8794-47AC-90B7-1F2E078096FF}">
-  <ds:schemaRefs>
-    <ds:schemaRef ds:uri="40262f94-9f35-4ac3-9a90-690165a166b7"/>
-    <ds:schemaRef ds:uri="a4f35948-e619-41b3-aa29-22878b09cfd2"/>
-    <ds:schemaRef ds:uri="http://www.w3.org/XML/1998/namespace"/>
-    <ds:schemaRef ds:uri="http://purl.org/dc/elements/1.1/"/>
-    <ds:schemaRef ds:uri="http://schemas.microsoft.com/office/2006/documentManagement/types"/>
-    <ds:schemaRef ds:uri="http://schemas.microsoft.com/office/2006/metadata/properties"/>
-    <ds:schemaRef ds:uri="http://purl.org/dc/dcmitype/"/>
-    <ds:schemaRef ds:uri="http://purl.org/dc/terms/"/>
-    <ds:schemaRef ds:uri="http://schemas.microsoft.com/office/infopath/2007/PartnerControls"/>
-    <ds:schemaRef ds:uri="http://schemas.openxmlformats.org/package/2006/metadata/core-properties"/>
-  </ds:schemaRefs>
-</ds:datastoreItem>
+<file path=customXml/item3.xml><?xml version="1.0" encoding="utf-8"?>
+<p:properties xmlns:p="http://schemas.microsoft.com/office/2006/metadata/properties" xmlns:xsi="http://www.w3.org/2001/XMLSchema-instance" xmlns:pc="http://schemas.microsoft.com/office/infopath/2007/PartnerControls">
+  <documentManagement>
+    <VSO_x0020_item_x0020_id xmlns="40262f94-9f35-4ac3-9a90-690165a166b7" xsi:nil="true"/>
+    <Assetid_x0020_ xmlns="40262f94-9f35-4ac3-9a90-690165a166b7" xsi:nil="true"/>
+    <Item_x0020_Details xmlns="40262f94-9f35-4ac3-9a90-690165a166b7" xsi:nil="true"/>
+    <Template_x0020_details xmlns="40262f94-9f35-4ac3-9a90-690165a166b7" xsi:nil="true"/>
+  </documentManagement>
+</p:properties>
 </file>
 
-<file path=customXml/itemProps3.xml><?xml version="1.0" encoding="utf-8"?>
+<file path=customXml/itemProps1.xml><?xml version="1.0" encoding="utf-8"?>
 <ds:datastoreItem xmlns:ds="http://schemas.openxmlformats.org/officeDocument/2006/customXml" ds:itemID="{7CB30B94-6D3B-4C91-947C-5EB8E8EFFE4F}">
   <ds:schemaRefs>
     <ds:schemaRef ds:uri="http://schemas.microsoft.com/office/2006/metadata/contentType"/>
@@ -9923,4 +9942,29 @@
     <ds:schemaRef ds:uri="http://schemas.microsoft.com/internal/obd"/>
   </ds:schemaRefs>
 </ds:datastoreItem>
+</file>
+
+<file path=customXml/itemProps2.xml><?xml version="1.0" encoding="utf-8"?>
+<ds:datastoreItem xmlns:ds="http://schemas.openxmlformats.org/officeDocument/2006/customXml" ds:itemID="{653E1689-1E09-4ADC-A5E7-6718BF79A8A6}">
+  <ds:schemaRefs>
+    <ds:schemaRef ds:uri="http://schemas.microsoft.com/sharepoint/v3/contenttype/forms"/>
+  </ds:schemaRefs>
+</ds:datastoreItem>
+</file>
+
+<file path=customXml/itemProps3.xml><?xml version="1.0" encoding="utf-8"?>
+<ds:datastoreItem xmlns:ds="http://schemas.openxmlformats.org/officeDocument/2006/customXml" ds:itemID="{3FFF1070-8794-47AC-90B7-1F2E078096FF}">
+  <ds:schemaRefs>
+    <ds:schemaRef ds:uri="40262f94-9f35-4ac3-9a90-690165a166b7"/>
+    <ds:schemaRef ds:uri="a4f35948-e619-41b3-aa29-22878b09cfd2"/>
+    <ds:schemaRef ds:uri="http://www.w3.org/XML/1998/namespace"/>
+    <ds:schemaRef ds:uri="http://purl.org/dc/elements/1.1/"/>
+    <ds:schemaRef ds:uri="http://schemas.microsoft.com/office/2006/documentManagement/types"/>
+    <ds:schemaRef ds:uri="http://schemas.microsoft.com/office/2006/metadata/properties"/>
+    <ds:schemaRef ds:uri="http://purl.org/dc/dcmitype/"/>
+    <ds:schemaRef ds:uri="http://purl.org/dc/terms/"/>
+    <ds:schemaRef ds:uri="http://schemas.microsoft.com/office/infopath/2007/PartnerControls"/>
+    <ds:schemaRef ds:uri="http://schemas.openxmlformats.org/package/2006/metadata/core-properties"/>
+  </ds:schemaRefs>
+</ds:datastoreItem>
 </file>
</xml_diff>